<commit_message>
Added AssemblyConfiguration on Parties.
</commit_message>
<xml_diff>
--- a/Doc/CK-AppIdentity.pptx
+++ b/Doc/CK-AppIdentity.pptx
@@ -294,7 +294,7 @@
           <a:p>
             <a:fld id="{7EBA75D8-A9A5-4FAF-B563-7A079B630A7E}" type="datetimeFigureOut">
               <a:rPr lang="en-US" smtClean="0"/>
-              <a:t>10/4/2023</a:t>
+              <a:t>12/5/2023</a:t>
             </a:fld>
             <a:endParaRPr lang="en-US"/>
           </a:p>
@@ -2142,7 +2142,7 @@
           <a:p>
             <a:fld id="{7D1F2140-8D48-49AC-AD8D-683E6FF4DC34}" type="datetimeFigureOut">
               <a:rPr lang="en-US" smtClean="0"/>
-              <a:t>10/4/2023</a:t>
+              <a:t>12/5/2023</a:t>
             </a:fld>
             <a:endParaRPr lang="en-US"/>
           </a:p>
@@ -2340,7 +2340,7 @@
           <a:p>
             <a:fld id="{7D1F2140-8D48-49AC-AD8D-683E6FF4DC34}" type="datetimeFigureOut">
               <a:rPr lang="en-US" smtClean="0"/>
-              <a:t>10/4/2023</a:t>
+              <a:t>12/5/2023</a:t>
             </a:fld>
             <a:endParaRPr lang="en-US"/>
           </a:p>
@@ -2548,7 +2548,7 @@
           <a:p>
             <a:fld id="{7D1F2140-8D48-49AC-AD8D-683E6FF4DC34}" type="datetimeFigureOut">
               <a:rPr lang="en-US" smtClean="0"/>
-              <a:t>10/4/2023</a:t>
+              <a:t>12/5/2023</a:t>
             </a:fld>
             <a:endParaRPr lang="en-US"/>
           </a:p>
@@ -2746,7 +2746,7 @@
           <a:p>
             <a:fld id="{7D1F2140-8D48-49AC-AD8D-683E6FF4DC34}" type="datetimeFigureOut">
               <a:rPr lang="en-US" smtClean="0"/>
-              <a:t>10/4/2023</a:t>
+              <a:t>12/5/2023</a:t>
             </a:fld>
             <a:endParaRPr lang="en-US"/>
           </a:p>
@@ -3021,7 +3021,7 @@
           <a:p>
             <a:fld id="{7D1F2140-8D48-49AC-AD8D-683E6FF4DC34}" type="datetimeFigureOut">
               <a:rPr lang="en-US" smtClean="0"/>
-              <a:t>10/4/2023</a:t>
+              <a:t>12/5/2023</a:t>
             </a:fld>
             <a:endParaRPr lang="en-US"/>
           </a:p>
@@ -3286,7 +3286,7 @@
           <a:p>
             <a:fld id="{7D1F2140-8D48-49AC-AD8D-683E6FF4DC34}" type="datetimeFigureOut">
               <a:rPr lang="en-US" smtClean="0"/>
-              <a:t>10/4/2023</a:t>
+              <a:t>12/5/2023</a:t>
             </a:fld>
             <a:endParaRPr lang="en-US"/>
           </a:p>
@@ -3698,7 +3698,7 @@
           <a:p>
             <a:fld id="{7D1F2140-8D48-49AC-AD8D-683E6FF4DC34}" type="datetimeFigureOut">
               <a:rPr lang="en-US" smtClean="0"/>
-              <a:t>10/4/2023</a:t>
+              <a:t>12/5/2023</a:t>
             </a:fld>
             <a:endParaRPr lang="en-US"/>
           </a:p>
@@ -3839,7 +3839,7 @@
           <a:p>
             <a:fld id="{7D1F2140-8D48-49AC-AD8D-683E6FF4DC34}" type="datetimeFigureOut">
               <a:rPr lang="en-US" smtClean="0"/>
-              <a:t>10/4/2023</a:t>
+              <a:t>12/5/2023</a:t>
             </a:fld>
             <a:endParaRPr lang="en-US"/>
           </a:p>
@@ -3952,7 +3952,7 @@
           <a:p>
             <a:fld id="{7D1F2140-8D48-49AC-AD8D-683E6FF4DC34}" type="datetimeFigureOut">
               <a:rPr lang="en-US" smtClean="0"/>
-              <a:t>10/4/2023</a:t>
+              <a:t>12/5/2023</a:t>
             </a:fld>
             <a:endParaRPr lang="en-US"/>
           </a:p>
@@ -4263,7 +4263,7 @@
           <a:p>
             <a:fld id="{7D1F2140-8D48-49AC-AD8D-683E6FF4DC34}" type="datetimeFigureOut">
               <a:rPr lang="en-US" smtClean="0"/>
-              <a:t>10/4/2023</a:t>
+              <a:t>12/5/2023</a:t>
             </a:fld>
             <a:endParaRPr lang="en-US"/>
           </a:p>
@@ -4551,7 +4551,7 @@
           <a:p>
             <a:fld id="{7D1F2140-8D48-49AC-AD8D-683E6FF4DC34}" type="datetimeFigureOut">
               <a:rPr lang="en-US" smtClean="0"/>
-              <a:t>10/4/2023</a:t>
+              <a:t>12/5/2023</a:t>
             </a:fld>
             <a:endParaRPr lang="en-US"/>
           </a:p>
@@ -4792,7 +4792,7 @@
           <a:p>
             <a:fld id="{7D1F2140-8D48-49AC-AD8D-683E6FF4DC34}" type="datetimeFigureOut">
               <a:rPr lang="en-US" smtClean="0"/>
-              <a:t>10/4/2023</a:t>
+              <a:t>12/5/2023</a:t>
             </a:fld>
             <a:endParaRPr lang="en-US"/>
           </a:p>
@@ -11979,12 +11979,48 @@
           <a:chExt cx="0" cy="0"/>
         </a:xfrm>
       </p:grpSpPr>
+      <p:sp>
+        <p:nvSpPr>
+          <p:cNvPr id="2" name="Title 1">
+            <a:extLst>
+              <a:ext uri="{FF2B5EF4-FFF2-40B4-BE49-F238E27FC236}">
+                <a16:creationId xmlns:a16="http://schemas.microsoft.com/office/drawing/2014/main" id="{A798245F-DD26-ADCC-6CD2-D5ED5F5598A9}"/>
+              </a:ext>
+            </a:extLst>
+          </p:cNvPr>
+          <p:cNvSpPr>
+            <a:spLocks noGrp="1"/>
+          </p:cNvSpPr>
+          <p:nvPr>
+            <p:ph type="title"/>
+          </p:nvPr>
+        </p:nvSpPr>
+        <p:spPr>
+          <a:xfrm>
+            <a:off x="317385" y="117700"/>
+            <a:ext cx="3022899" cy="1689586"/>
+          </a:xfrm>
+        </p:spPr>
+        <p:txBody>
+          <a:bodyPr>
+            <a:normAutofit/>
+          </a:bodyPr>
+          <a:lstStyle/>
+          <a:p>
+            <a:pPr algn="r"/>
+            <a:r>
+              <a:rPr lang="en-US" sz="4000" dirty="0"/>
+              <a:t>Configuration Model</a:t>
+            </a:r>
+          </a:p>
+        </p:txBody>
+      </p:sp>
       <p:pic>
         <p:nvPicPr>
-          <p:cNvPr id="4" name="Picture 3" descr="A screenshot of a computer&#10;&#10;Description automatically generated">
+          <p:cNvPr id="5" name="Picture 4" descr="A screenshot of a computer&#10;&#10;Description automatically generated">
             <a:extLst>
               <a:ext uri="{FF2B5EF4-FFF2-40B4-BE49-F238E27FC236}">
-                <a16:creationId xmlns:a16="http://schemas.microsoft.com/office/drawing/2014/main" id="{FA301257-1951-1826-275A-A1911242E7B5}"/>
+                <a16:creationId xmlns:a16="http://schemas.microsoft.com/office/drawing/2014/main" id="{C877AF6B-7CB2-7C72-78B8-A3149BA3EE51}"/>
               </a:ext>
             </a:extLst>
           </p:cNvPr>
@@ -12007,50 +12043,14 @@
         </p:blipFill>
         <p:spPr>
           <a:xfrm>
-            <a:off x="3150535" y="117700"/>
-            <a:ext cx="8600890" cy="6622600"/>
+            <a:off x="3728273" y="117700"/>
+            <a:ext cx="8014681" cy="6858000"/>
           </a:xfrm>
           <a:prstGeom prst="rect">
             <a:avLst/>
           </a:prstGeom>
         </p:spPr>
       </p:pic>
-      <p:sp>
-        <p:nvSpPr>
-          <p:cNvPr id="2" name="Title 1">
-            <a:extLst>
-              <a:ext uri="{FF2B5EF4-FFF2-40B4-BE49-F238E27FC236}">
-                <a16:creationId xmlns:a16="http://schemas.microsoft.com/office/drawing/2014/main" id="{A798245F-DD26-ADCC-6CD2-D5ED5F5598A9}"/>
-              </a:ext>
-            </a:extLst>
-          </p:cNvPr>
-          <p:cNvSpPr>
-            <a:spLocks noGrp="1"/>
-          </p:cNvSpPr>
-          <p:nvPr>
-            <p:ph type="title"/>
-          </p:nvPr>
-        </p:nvSpPr>
-        <p:spPr>
-          <a:xfrm>
-            <a:off x="317385" y="117700"/>
-            <a:ext cx="3022899" cy="1689586"/>
-          </a:xfrm>
-        </p:spPr>
-        <p:txBody>
-          <a:bodyPr>
-            <a:normAutofit/>
-          </a:bodyPr>
-          <a:lstStyle/>
-          <a:p>
-            <a:pPr algn="r"/>
-            <a:r>
-              <a:rPr lang="en-US" sz="4000" dirty="0"/>
-              <a:t>Configuration Model</a:t>
-            </a:r>
-          </a:p>
-        </p:txBody>
-      </p:sp>
     </p:spTree>
     <p:extLst>
       <p:ext uri="{BB962C8B-B14F-4D97-AF65-F5344CB8AC3E}">
@@ -16463,8 +16463,8 @@
         </p:nvSpPr>
         <p:spPr>
           <a:xfrm>
-            <a:off x="838200" y="1825625"/>
-            <a:ext cx="4770632" cy="4667250"/>
+            <a:off x="609600" y="1825625"/>
+            <a:ext cx="4999232" cy="4667250"/>
           </a:xfrm>
           <a:prstGeom prst="rect">
             <a:avLst/>
@@ -16686,7 +16686,7 @@
             </a:r>
             <a:r>
               <a:rPr lang="en-US" dirty="0"/>
-              <a:t> returns messages don’t need to be disposed.</a:t>
+              <a:t> returned messages don’t need to be disposed.</a:t>
             </a:r>
           </a:p>
           <a:p>

</xml_diff>

<commit_message>
Added the explicit support of the "Local" configuration.
</commit_message>
<xml_diff>
--- a/Doc/CK-AppIdentity.pptx
+++ b/Doc/CK-AppIdentity.pptx
@@ -294,7 +294,7 @@
           <a:p>
             <a:fld id="{7EBA75D8-A9A5-4FAF-B563-7A079B630A7E}" type="datetimeFigureOut">
               <a:rPr lang="en-US" smtClean="0"/>
-              <a:t>12/5/2023</a:t>
+              <a:t>12/9/2023</a:t>
             </a:fld>
             <a:endParaRPr lang="en-US"/>
           </a:p>
@@ -766,6 +766,90 @@
           <a:p>
             <a:fld id="{E05EDB92-2FE2-4164-AA27-D03258A20DF4}" type="slidenum">
               <a:rPr lang="en-US" smtClean="0"/>
+              <a:t>33</a:t>
+            </a:fld>
+            <a:endParaRPr lang="en-US"/>
+          </a:p>
+        </p:txBody>
+      </p:sp>
+    </p:spTree>
+    <p:extLst>
+      <p:ext uri="{BB962C8B-B14F-4D97-AF65-F5344CB8AC3E}">
+        <p14:creationId xmlns:p14="http://schemas.microsoft.com/office/powerpoint/2010/main" val="213048778"/>
+      </p:ext>
+    </p:extLst>
+  </p:cSld>
+  <p:clrMapOvr>
+    <a:masterClrMapping/>
+  </p:clrMapOvr>
+</p:notes>
+</file>
+
+<file path=ppt/notesSlides/notesSlide11.xml><?xml version="1.0" encoding="utf-8"?>
+<p:notes xmlns:a="http://schemas.openxmlformats.org/drawingml/2006/main" xmlns:r="http://schemas.openxmlformats.org/officeDocument/2006/relationships" xmlns:p="http://schemas.openxmlformats.org/presentationml/2006/main">
+  <p:cSld>
+    <p:spTree>
+      <p:nvGrpSpPr>
+        <p:cNvPr id="1" name=""/>
+        <p:cNvGrpSpPr/>
+        <p:nvPr/>
+      </p:nvGrpSpPr>
+      <p:grpSpPr>
+        <a:xfrm>
+          <a:off x="0" y="0"/>
+          <a:ext cx="0" cy="0"/>
+          <a:chOff x="0" y="0"/>
+          <a:chExt cx="0" cy="0"/>
+        </a:xfrm>
+      </p:grpSpPr>
+      <p:sp>
+        <p:nvSpPr>
+          <p:cNvPr id="2" name="Slide Image Placeholder 1"/>
+          <p:cNvSpPr>
+            <a:spLocks noGrp="1" noRot="1" noChangeAspect="1"/>
+          </p:cNvSpPr>
+          <p:nvPr>
+            <p:ph type="sldImg"/>
+          </p:nvPr>
+        </p:nvSpPr>
+        <p:spPr/>
+      </p:sp>
+      <p:sp>
+        <p:nvSpPr>
+          <p:cNvPr id="3" name="Notes Placeholder 2"/>
+          <p:cNvSpPr>
+            <a:spLocks noGrp="1"/>
+          </p:cNvSpPr>
+          <p:nvPr>
+            <p:ph type="body" idx="1"/>
+          </p:nvPr>
+        </p:nvSpPr>
+        <p:spPr/>
+        <p:txBody>
+          <a:bodyPr/>
+          <a:lstStyle/>
+          <a:p>
+            <a:endParaRPr lang="en-US" dirty="0"/>
+          </a:p>
+        </p:txBody>
+      </p:sp>
+      <p:sp>
+        <p:nvSpPr>
+          <p:cNvPr id="4" name="Slide Number Placeholder 3"/>
+          <p:cNvSpPr>
+            <a:spLocks noGrp="1"/>
+          </p:cNvSpPr>
+          <p:nvPr>
+            <p:ph type="sldNum" sz="quarter" idx="5"/>
+          </p:nvPr>
+        </p:nvSpPr>
+        <p:spPr/>
+        <p:txBody>
+          <a:bodyPr/>
+          <a:lstStyle/>
+          <a:p>
+            <a:fld id="{E05EDB92-2FE2-4164-AA27-D03258A20DF4}" type="slidenum">
+              <a:rPr lang="en-US" smtClean="0"/>
               <a:t>34</a:t>
             </a:fld>
             <a:endParaRPr lang="en-US"/>
@@ -850,7 +934,7 @@
           <a:p>
             <a:fld id="{E05EDB92-2FE2-4164-AA27-D03258A20DF4}" type="slidenum">
               <a:rPr lang="en-US" smtClean="0"/>
-              <a:t>21</a:t>
+              <a:t>20</a:t>
             </a:fld>
             <a:endParaRPr lang="en-US"/>
           </a:p>
@@ -859,7 +943,7 @@
     </p:spTree>
     <p:extLst>
       <p:ext uri="{BB962C8B-B14F-4D97-AF65-F5344CB8AC3E}">
-        <p14:creationId xmlns:p14="http://schemas.microsoft.com/office/powerpoint/2010/main" val="3471580468"/>
+        <p14:creationId xmlns:p14="http://schemas.microsoft.com/office/powerpoint/2010/main" val="4026643574"/>
       </p:ext>
     </p:extLst>
   </p:cSld>
@@ -934,7 +1018,7 @@
           <a:p>
             <a:fld id="{E05EDB92-2FE2-4164-AA27-D03258A20DF4}" type="slidenum">
               <a:rPr lang="en-US" smtClean="0"/>
-              <a:t>22</a:t>
+              <a:t>21</a:t>
             </a:fld>
             <a:endParaRPr lang="en-US"/>
           </a:p>
@@ -943,7 +1027,7 @@
     </p:spTree>
     <p:extLst>
       <p:ext uri="{BB962C8B-B14F-4D97-AF65-F5344CB8AC3E}">
-        <p14:creationId xmlns:p14="http://schemas.microsoft.com/office/powerpoint/2010/main" val="1461454158"/>
+        <p14:creationId xmlns:p14="http://schemas.microsoft.com/office/powerpoint/2010/main" val="3471580468"/>
       </p:ext>
     </p:extLst>
   </p:cSld>
@@ -997,20 +1081,6 @@
           <a:bodyPr/>
           <a:lstStyle/>
           <a:p>
-            <a:r>
-              <a:rPr lang="en-US" dirty="0"/>
-              <a:t>Allow/</a:t>
-            </a:r>
-            <a:r>
-              <a:rPr lang="en-US" dirty="0" err="1"/>
-              <a:t>DisallowFeatures</a:t>
-            </a:r>
-            <a:r>
-              <a:rPr lang="en-US" dirty="0"/>
-              <a:t> can be a string or an array of strings.</a:t>
-            </a:r>
-          </a:p>
-          <a:p>
             <a:endParaRPr lang="en-US" dirty="0"/>
           </a:p>
         </p:txBody>
@@ -1032,7 +1102,7 @@
           <a:p>
             <a:fld id="{E05EDB92-2FE2-4164-AA27-D03258A20DF4}" type="slidenum">
               <a:rPr lang="en-US" smtClean="0"/>
-              <a:t>25</a:t>
+              <a:t>22</a:t>
             </a:fld>
             <a:endParaRPr lang="en-US"/>
           </a:p>
@@ -1041,7 +1111,7 @@
     </p:spTree>
     <p:extLst>
       <p:ext uri="{BB962C8B-B14F-4D97-AF65-F5344CB8AC3E}">
-        <p14:creationId xmlns:p14="http://schemas.microsoft.com/office/powerpoint/2010/main" val="1551059755"/>
+        <p14:creationId xmlns:p14="http://schemas.microsoft.com/office/powerpoint/2010/main" val="1461454158"/>
       </p:ext>
     </p:extLst>
   </p:cSld>
@@ -1095,6 +1165,20 @@
           <a:bodyPr/>
           <a:lstStyle/>
           <a:p>
+            <a:r>
+              <a:rPr lang="en-US" dirty="0"/>
+              <a:t>Allow/</a:t>
+            </a:r>
+            <a:r>
+              <a:rPr lang="en-US" dirty="0" err="1"/>
+              <a:t>DisallowFeatures</a:t>
+            </a:r>
+            <a:r>
+              <a:rPr lang="en-US" dirty="0"/>
+              <a:t> can be a string or an array of strings.</a:t>
+            </a:r>
+          </a:p>
+          <a:p>
             <a:endParaRPr lang="en-US" dirty="0"/>
           </a:p>
         </p:txBody>
@@ -1116,7 +1200,7 @@
           <a:p>
             <a:fld id="{E05EDB92-2FE2-4164-AA27-D03258A20DF4}" type="slidenum">
               <a:rPr lang="en-US" smtClean="0"/>
-              <a:t>28</a:t>
+              <a:t>25</a:t>
             </a:fld>
             <a:endParaRPr lang="en-US"/>
           </a:p>
@@ -1125,7 +1209,7 @@
     </p:spTree>
     <p:extLst>
       <p:ext uri="{BB962C8B-B14F-4D97-AF65-F5344CB8AC3E}">
-        <p14:creationId xmlns:p14="http://schemas.microsoft.com/office/powerpoint/2010/main" val="1570586495"/>
+        <p14:creationId xmlns:p14="http://schemas.microsoft.com/office/powerpoint/2010/main" val="1551059755"/>
       </p:ext>
     </p:extLst>
   </p:cSld>
@@ -1179,28 +1263,6 @@
           <a:bodyPr/>
           <a:lstStyle/>
           <a:p>
-            <a:r>
-              <a:rPr lang="en-US" dirty="0"/>
-              <a:t>Before detailing the Channels, we need to cover the </a:t>
-            </a:r>
-            <a:r>
-              <a:rPr lang="en-US" dirty="0" err="1"/>
-              <a:t>TransportMessage</a:t>
-            </a:r>
-            <a:r>
-              <a:rPr lang="en-US" dirty="0"/>
-              <a:t> and its Factories and the Transport and </a:t>
-            </a:r>
-            <a:r>
-              <a:rPr lang="en-US" dirty="0" err="1"/>
-              <a:t>TransportType</a:t>
-            </a:r>
-            <a:r>
-              <a:rPr lang="en-US" dirty="0"/>
-              <a:t> model.</a:t>
-            </a:r>
-          </a:p>
-          <a:p>
             <a:endParaRPr lang="en-US" dirty="0"/>
           </a:p>
         </p:txBody>
@@ -1222,7 +1284,7 @@
           <a:p>
             <a:fld id="{E05EDB92-2FE2-4164-AA27-D03258A20DF4}" type="slidenum">
               <a:rPr lang="en-US" smtClean="0"/>
-              <a:t>29</a:t>
+              <a:t>28</a:t>
             </a:fld>
             <a:endParaRPr lang="en-US"/>
           </a:p>
@@ -1231,7 +1293,7 @@
     </p:spTree>
     <p:extLst>
       <p:ext uri="{BB962C8B-B14F-4D97-AF65-F5344CB8AC3E}">
-        <p14:creationId xmlns:p14="http://schemas.microsoft.com/office/powerpoint/2010/main" val="1107907762"/>
+        <p14:creationId xmlns:p14="http://schemas.microsoft.com/office/powerpoint/2010/main" val="1570586495"/>
       </p:ext>
     </p:extLst>
   </p:cSld>
@@ -1286,387 +1348,28 @@
           <a:lstStyle/>
           <a:p>
             <a:r>
-              <a:rPr lang="en-US" sz="1800" dirty="0">
-                <a:solidFill>
-                  <a:srgbClr val="000000"/>
-                </a:solidFill>
-                <a:latin typeface="Consolas" panose="020B0609020204030204" pitchFamily="49" charset="0"/>
-              </a:rPr>
-              <a:t>All messages exchanged by the Transport layer are prefixed by the message's protocol and length.</a:t>
-            </a:r>
-          </a:p>
-          <a:p>
-            <a:r>
-              <a:rPr lang="en-US" sz="1800" dirty="0">
-                <a:solidFill>
-                  <a:srgbClr val="000000"/>
-                </a:solidFill>
-                <a:latin typeface="Consolas" panose="020B0609020204030204" pitchFamily="49" charset="0"/>
-              </a:rPr>
-              <a:t>- The prefix starts with a first byte: </a:t>
-            </a:r>
-            <a:r>
-              <a:rPr lang="en-US" sz="1800" dirty="0">
-                <a:solidFill>
-                  <a:srgbClr val="0000FF"/>
-                </a:solidFill>
-                <a:latin typeface="Consolas" panose="020B0609020204030204" pitchFamily="49" charset="0"/>
-              </a:rPr>
-              <a:t>`|L0|L1|CD|R0|R1|P0|P1|P2|`</a:t>
-            </a:r>
-            <a:r>
-              <a:rPr lang="en-US" sz="1800" dirty="0">
-                <a:solidFill>
-                  <a:srgbClr val="000000"/>
-                </a:solidFill>
-                <a:latin typeface="Consolas" panose="020B0609020204030204" pitchFamily="49" charset="0"/>
-              </a:rPr>
-              <a:t>.</a:t>
-            </a:r>
-          </a:p>
-          <a:p>
-            <a:r>
-              <a:rPr lang="en-US" sz="1800" dirty="0">
-                <a:solidFill>
-                  <a:srgbClr val="000000"/>
-                </a:solidFill>
-                <a:latin typeface="Consolas" panose="020B0609020204030204" pitchFamily="49" charset="0"/>
-              </a:rPr>
-              <a:t>  - The 2 MSB (L0-L1) gives us the number of bytes of the message length:</a:t>
-            </a:r>
-          </a:p>
-          <a:p>
-            <a:r>
-              <a:rPr lang="en-US" sz="1800" dirty="0">
-                <a:solidFill>
-                  <a:srgbClr val="000000"/>
-                </a:solidFill>
-                <a:latin typeface="Consolas" panose="020B0609020204030204" pitchFamily="49" charset="0"/>
-              </a:rPr>
-              <a:t>    - </a:t>
-            </a:r>
-            <a:r>
-              <a:rPr lang="en-US" sz="1800" dirty="0">
-                <a:solidFill>
-                  <a:srgbClr val="0000FF"/>
-                </a:solidFill>
-                <a:latin typeface="Consolas" panose="020B0609020204030204" pitchFamily="49" charset="0"/>
-              </a:rPr>
-              <a:t>`00`</a:t>
-            </a:r>
-            <a:r>
-              <a:rPr lang="en-US" sz="1800" dirty="0">
-                <a:solidFill>
-                  <a:srgbClr val="000000"/>
-                </a:solidFill>
-                <a:latin typeface="Consolas" panose="020B0609020204030204" pitchFamily="49" charset="0"/>
-              </a:rPr>
-              <a:t> 1 byte, the message length is between 0 and 255 bytes.</a:t>
-            </a:r>
-          </a:p>
-          <a:p>
-            <a:r>
-              <a:rPr lang="en-US" sz="1800" dirty="0">
-                <a:solidFill>
-                  <a:srgbClr val="000000"/>
-                </a:solidFill>
-                <a:latin typeface="Consolas" panose="020B0609020204030204" pitchFamily="49" charset="0"/>
-              </a:rPr>
-              <a:t>    - </a:t>
-            </a:r>
-            <a:r>
-              <a:rPr lang="en-US" sz="1800" dirty="0">
-                <a:solidFill>
-                  <a:srgbClr val="0000FF"/>
-                </a:solidFill>
-                <a:latin typeface="Consolas" panose="020B0609020204030204" pitchFamily="49" charset="0"/>
-              </a:rPr>
-              <a:t>`01`</a:t>
-            </a:r>
-            <a:r>
-              <a:rPr lang="en-US" sz="1800" dirty="0">
-                <a:solidFill>
-                  <a:srgbClr val="000000"/>
-                </a:solidFill>
-                <a:latin typeface="Consolas" panose="020B0609020204030204" pitchFamily="49" charset="0"/>
-              </a:rPr>
-              <a:t> 2 bytes, the message length is between 256 and 65535 bytes.</a:t>
-            </a:r>
-          </a:p>
-          <a:p>
-            <a:r>
-              <a:rPr lang="en-US" sz="1800" dirty="0">
-                <a:solidFill>
-                  <a:srgbClr val="000000"/>
-                </a:solidFill>
-                <a:latin typeface="Consolas" panose="020B0609020204030204" pitchFamily="49" charset="0"/>
-              </a:rPr>
-              <a:t>    - </a:t>
-            </a:r>
-            <a:r>
-              <a:rPr lang="en-US" sz="1800" dirty="0">
-                <a:solidFill>
-                  <a:srgbClr val="0000FF"/>
-                </a:solidFill>
-                <a:latin typeface="Consolas" panose="020B0609020204030204" pitchFamily="49" charset="0"/>
-              </a:rPr>
-              <a:t>`10`</a:t>
-            </a:r>
-            <a:r>
-              <a:rPr lang="en-US" sz="1800" dirty="0">
-                <a:solidFill>
-                  <a:srgbClr val="000000"/>
-                </a:solidFill>
-                <a:latin typeface="Consolas" panose="020B0609020204030204" pitchFamily="49" charset="0"/>
-              </a:rPr>
-              <a:t> 3 bytes, the message length is between 65536 and 16 777 215 bytes.</a:t>
-            </a:r>
-          </a:p>
-          <a:p>
-            <a:r>
-              <a:rPr lang="en-US" sz="1800" dirty="0">
-                <a:solidFill>
-                  <a:srgbClr val="000000"/>
-                </a:solidFill>
-                <a:latin typeface="Consolas" panose="020B0609020204030204" pitchFamily="49" charset="0"/>
-              </a:rPr>
-              <a:t>    - </a:t>
-            </a:r>
-            <a:r>
-              <a:rPr lang="en-US" sz="1800" dirty="0">
-                <a:solidFill>
-                  <a:srgbClr val="0000FF"/>
-                </a:solidFill>
-                <a:latin typeface="Consolas" panose="020B0609020204030204" pitchFamily="49" charset="0"/>
-              </a:rPr>
-              <a:t>`11`</a:t>
-            </a:r>
-            <a:r>
-              <a:rPr lang="en-US" sz="1800" dirty="0">
-                <a:solidFill>
-                  <a:srgbClr val="000000"/>
-                </a:solidFill>
-                <a:latin typeface="Consolas" panose="020B0609020204030204" pitchFamily="49" charset="0"/>
-              </a:rPr>
-              <a:t> 4 bytes, the message length is between 16 777 216 and 2 147 483 648 bytes (2 Gib).</a:t>
-            </a:r>
-          </a:p>
-          <a:p>
-            <a:r>
-              <a:rPr lang="en-US" sz="1800" dirty="0">
-                <a:solidFill>
-                  <a:srgbClr val="000000"/>
-                </a:solidFill>
-                <a:latin typeface="Consolas" panose="020B0609020204030204" pitchFamily="49" charset="0"/>
-              </a:rPr>
-              <a:t>  - The </a:t>
-            </a:r>
-            <a:r>
-              <a:rPr lang="en-US" sz="1800" dirty="0">
-                <a:solidFill>
-                  <a:srgbClr val="0000FF"/>
-                </a:solidFill>
-                <a:latin typeface="Consolas" panose="020B0609020204030204" pitchFamily="49" charset="0"/>
-              </a:rPr>
-              <a:t>`CD`</a:t>
-            </a:r>
-            <a:r>
-              <a:rPr lang="en-US" sz="1800" dirty="0">
-                <a:solidFill>
-                  <a:srgbClr val="000000"/>
-                </a:solidFill>
-                <a:latin typeface="Consolas" panose="020B0609020204030204" pitchFamily="49" charset="0"/>
-              </a:rPr>
-              <a:t> bit is the "Control vs. Data" bit. This is a convenient bit that can be used by protocols</a:t>
-            </a:r>
-          </a:p>
-          <a:p>
-            <a:r>
-              <a:rPr lang="en-US" sz="1800" dirty="0">
-                <a:solidFill>
-                  <a:srgbClr val="000000"/>
-                </a:solidFill>
-                <a:latin typeface="Consolas" panose="020B0609020204030204" pitchFamily="49" charset="0"/>
-              </a:rPr>
-              <a:t>    as a one-bit discriminator, typically between a regular data message and one (or more) control message.</a:t>
-            </a:r>
-          </a:p>
-          <a:p>
-            <a:r>
-              <a:rPr lang="en-US" sz="1800" dirty="0">
-                <a:solidFill>
-                  <a:srgbClr val="000000"/>
-                </a:solidFill>
-                <a:latin typeface="Consolas" panose="020B0609020204030204" pitchFamily="49" charset="0"/>
-              </a:rPr>
-              <a:t>  - </a:t>
-            </a:r>
-            <a:r>
-              <a:rPr lang="en-US" sz="1800" dirty="0">
-                <a:solidFill>
-                  <a:srgbClr val="0000FF"/>
-                </a:solidFill>
-                <a:latin typeface="Consolas" panose="020B0609020204030204" pitchFamily="49" charset="0"/>
-              </a:rPr>
-              <a:t>`R0`</a:t>
-            </a:r>
-            <a:r>
-              <a:rPr lang="en-US" sz="1800" dirty="0">
-                <a:solidFill>
-                  <a:srgbClr val="000000"/>
-                </a:solidFill>
-                <a:latin typeface="Consolas" panose="020B0609020204030204" pitchFamily="49" charset="0"/>
-              </a:rPr>
-              <a:t> and </a:t>
-            </a:r>
-            <a:r>
-              <a:rPr lang="en-US" sz="1800" dirty="0">
-                <a:solidFill>
-                  <a:srgbClr val="0000FF"/>
-                </a:solidFill>
-                <a:latin typeface="Consolas" panose="020B0609020204030204" pitchFamily="49" charset="0"/>
-              </a:rPr>
-              <a:t>`R1`</a:t>
-            </a:r>
-            <a:r>
-              <a:rPr lang="en-US" sz="1800" dirty="0">
-                <a:solidFill>
-                  <a:srgbClr val="000000"/>
-                </a:solidFill>
-                <a:latin typeface="Consolas" panose="020B0609020204030204" pitchFamily="49" charset="0"/>
-              </a:rPr>
-              <a:t> bit are reserved for future use.</a:t>
-            </a:r>
-          </a:p>
-          <a:p>
-            <a:r>
-              <a:rPr lang="en-US" sz="1800" dirty="0">
-                <a:solidFill>
-                  <a:srgbClr val="000000"/>
-                </a:solidFill>
-                <a:latin typeface="Consolas" panose="020B0609020204030204" pitchFamily="49" charset="0"/>
-              </a:rPr>
-              <a:t>  - P0-P2 bits is the Protocol, a number between 0 and 7. This number defines the "type" of the</a:t>
-            </a:r>
-          </a:p>
-          <a:p>
-            <a:r>
-              <a:rPr lang="en-US" sz="1800" dirty="0">
-                <a:solidFill>
-                  <a:srgbClr val="000000"/>
-                </a:solidFill>
-                <a:latin typeface="Consolas" panose="020B0609020204030204" pitchFamily="49" charset="0"/>
-              </a:rPr>
-              <a:t>  message: the writer or serializer that has been used to write the payload and the reader or "</a:t>
-            </a:r>
-            <a:r>
-              <a:rPr lang="en-US" sz="1800" dirty="0" err="1">
-                <a:solidFill>
-                  <a:srgbClr val="000000"/>
-                </a:solidFill>
-                <a:latin typeface="Consolas" panose="020B0609020204030204" pitchFamily="49" charset="0"/>
-              </a:rPr>
-              <a:t>deserializer</a:t>
-            </a:r>
-            <a:r>
-              <a:rPr lang="en-US" sz="1800" dirty="0">
-                <a:solidFill>
-                  <a:srgbClr val="000000"/>
-                </a:solidFill>
-                <a:latin typeface="Consolas" panose="020B0609020204030204" pitchFamily="49" charset="0"/>
-              </a:rPr>
-              <a:t>"</a:t>
-            </a:r>
-          </a:p>
-          <a:p>
-            <a:r>
-              <a:rPr lang="en-US" sz="1800" dirty="0">
-                <a:solidFill>
-                  <a:srgbClr val="000000"/>
-                </a:solidFill>
-                <a:latin typeface="Consolas" panose="020B0609020204030204" pitchFamily="49" charset="0"/>
-              </a:rPr>
-              <a:t>  that must be used to read it back.</a:t>
-            </a:r>
-          </a:p>
-          <a:p>
-            <a:r>
-              <a:rPr lang="en-US" sz="1800" dirty="0">
-                <a:solidFill>
-                  <a:srgbClr val="000000"/>
-                </a:solidFill>
-                <a:latin typeface="Consolas" panose="020B0609020204030204" pitchFamily="49" charset="0"/>
-              </a:rPr>
-              <a:t>- Then comes the message length itself (1 to 4 bytes)</a:t>
-            </a:r>
-          </a:p>
-          <a:p>
-            <a:r>
-              <a:rPr lang="en-US" sz="1800" dirty="0">
-                <a:solidFill>
-                  <a:srgbClr val="000000"/>
-                </a:solidFill>
-                <a:latin typeface="Consolas" panose="020B0609020204030204" pitchFamily="49" charset="0"/>
-              </a:rPr>
-              <a:t>- Then the message payload itself.</a:t>
-            </a:r>
-          </a:p>
-          <a:p>
-            <a:endParaRPr lang="en-US" sz="1800" dirty="0">
-              <a:solidFill>
-                <a:srgbClr val="000000"/>
-              </a:solidFill>
-              <a:latin typeface="Consolas" panose="020B0609020204030204" pitchFamily="49" charset="0"/>
-            </a:endParaRPr>
-          </a:p>
-          <a:p>
-            <a:r>
-              <a:rPr lang="en-US" sz="1800" dirty="0">
-                <a:solidFill>
-                  <a:srgbClr val="000000"/>
-                </a:solidFill>
-                <a:latin typeface="Consolas" panose="020B0609020204030204" pitchFamily="49" charset="0"/>
-              </a:rPr>
-              <a:t>At a higher level </a:t>
-            </a:r>
-            <a:r>
-              <a:rPr lang="en-US" sz="1800" dirty="0">
-                <a:solidFill>
-                  <a:srgbClr val="A31515"/>
-                </a:solidFill>
-                <a:latin typeface="Consolas" panose="020B0609020204030204" pitchFamily="49" charset="0"/>
-              </a:rPr>
-              <a:t>"</a:t>
-            </a:r>
-            <a:r>
-              <a:rPr lang="en-US" sz="1800" dirty="0" err="1">
-                <a:solidFill>
-                  <a:srgbClr val="000000"/>
-                </a:solidFill>
-                <a:latin typeface="Consolas" panose="020B0609020204030204" pitchFamily="49" charset="0"/>
-              </a:rPr>
-              <a:t>MessageProtocol</a:t>
-            </a:r>
-            <a:r>
-              <a:rPr lang="en-US" sz="1800" dirty="0">
-                <a:solidFill>
-                  <a:srgbClr val="000000"/>
-                </a:solidFill>
-                <a:latin typeface="Consolas" panose="020B0609020204030204" pitchFamily="49" charset="0"/>
-              </a:rPr>
-              <a:t>” are identified by a string (its unique name).</a:t>
-            </a:r>
-          </a:p>
-          <a:p>
-            <a:r>
-              <a:rPr lang="en-US" sz="1800" dirty="0">
-                <a:solidFill>
-                  <a:srgbClr val="000000"/>
-                </a:solidFill>
-                <a:latin typeface="Consolas" panose="020B0609020204030204" pitchFamily="49" charset="0"/>
-              </a:rPr>
-              <a:t>A protocol defines how the message is encoded and how they are exchanged: by merging these 2 concepts here, we greatly simplify the implementation and the understandability of the Transport layer. The protocol simply defines the encoding it uses.</a:t>
-            </a:r>
+              <a:rPr lang="en-US" dirty="0"/>
+              <a:t>Before detailing the Channels, we need to cover the </a:t>
+            </a:r>
+            <a:r>
+              <a:rPr lang="en-US" dirty="0" err="1"/>
+              <a:t>TransportMessage</a:t>
+            </a:r>
+            <a:r>
+              <a:rPr lang="en-US" dirty="0"/>
+              <a:t> and its Factories and the Transport and </a:t>
+            </a:r>
+            <a:r>
+              <a:rPr lang="en-US" dirty="0" err="1"/>
+              <a:t>TransportType</a:t>
+            </a:r>
+            <a:r>
+              <a:rPr lang="en-US" dirty="0"/>
+              <a:t> model.</a:t>
+            </a:r>
+          </a:p>
+          <a:p>
+            <a:endParaRPr lang="en-US" dirty="0"/>
           </a:p>
         </p:txBody>
       </p:sp>
@@ -1687,7 +1390,7 @@
           <a:p>
             <a:fld id="{E05EDB92-2FE2-4164-AA27-D03258A20DF4}" type="slidenum">
               <a:rPr lang="en-US" smtClean="0"/>
-              <a:t>30</a:t>
+              <a:t>29</a:t>
             </a:fld>
             <a:endParaRPr lang="en-US"/>
           </a:p>
@@ -1696,7 +1399,7 @@
     </p:spTree>
     <p:extLst>
       <p:ext uri="{BB962C8B-B14F-4D97-AF65-F5344CB8AC3E}">
-        <p14:creationId xmlns:p14="http://schemas.microsoft.com/office/powerpoint/2010/main" val="4115452317"/>
+        <p14:creationId xmlns:p14="http://schemas.microsoft.com/office/powerpoint/2010/main" val="1107907762"/>
       </p:ext>
     </p:extLst>
   </p:cSld>
@@ -1757,16 +1460,27 @@
                 </a:solidFill>
                 <a:latin typeface="Consolas" panose="020B0609020204030204" pitchFamily="49" charset="0"/>
               </a:rPr>
-              <a:t>The </a:t>
-            </a:r>
+              <a:t>All messages exchanged by the Transport layer are prefixed by the message's protocol and length.</a:t>
+            </a:r>
+          </a:p>
+          <a:p>
             <a:r>
               <a:rPr lang="en-US" sz="1800" dirty="0">
                 <a:solidFill>
+                  <a:srgbClr val="000000"/>
+                </a:solidFill>
+                <a:latin typeface="Consolas" panose="020B0609020204030204" pitchFamily="49" charset="0"/>
+              </a:rPr>
+              <a:t>- The prefix starts with a first byte: </a:t>
+            </a:r>
+            <a:r>
+              <a:rPr lang="en-US" sz="1800" dirty="0">
+                <a:solidFill>
                   <a:srgbClr val="0000FF"/>
                 </a:solidFill>
                 <a:latin typeface="Consolas" panose="020B0609020204030204" pitchFamily="49" charset="0"/>
               </a:rPr>
-              <a:t>`"0 Protocol"`</a:t>
+              <a:t>`|L0|L1|CD|R0|R1|P0|P1|P2|`</a:t>
             </a:r>
             <a:r>
               <a:rPr lang="en-US" sz="1800" dirty="0">
@@ -1775,7 +1489,243 @@
                 </a:solidFill>
                 <a:latin typeface="Consolas" panose="020B0609020204030204" pitchFamily="49" charset="0"/>
               </a:rPr>
-              <a:t> protocol name is reserved: this is the protocol of </a:t>
+              <a:t>.</a:t>
+            </a:r>
+          </a:p>
+          <a:p>
+            <a:r>
+              <a:rPr lang="en-US" sz="1800" dirty="0">
+                <a:solidFill>
+                  <a:srgbClr val="000000"/>
+                </a:solidFill>
+                <a:latin typeface="Consolas" panose="020B0609020204030204" pitchFamily="49" charset="0"/>
+              </a:rPr>
+              <a:t>  - The 2 MSB (L0-L1) gives us the number of bytes of the message length:</a:t>
+            </a:r>
+          </a:p>
+          <a:p>
+            <a:r>
+              <a:rPr lang="en-US" sz="1800" dirty="0">
+                <a:solidFill>
+                  <a:srgbClr val="000000"/>
+                </a:solidFill>
+                <a:latin typeface="Consolas" panose="020B0609020204030204" pitchFamily="49" charset="0"/>
+              </a:rPr>
+              <a:t>    - </a:t>
+            </a:r>
+            <a:r>
+              <a:rPr lang="en-US" sz="1800" dirty="0">
+                <a:solidFill>
+                  <a:srgbClr val="0000FF"/>
+                </a:solidFill>
+                <a:latin typeface="Consolas" panose="020B0609020204030204" pitchFamily="49" charset="0"/>
+              </a:rPr>
+              <a:t>`00`</a:t>
+            </a:r>
+            <a:r>
+              <a:rPr lang="en-US" sz="1800" dirty="0">
+                <a:solidFill>
+                  <a:srgbClr val="000000"/>
+                </a:solidFill>
+                <a:latin typeface="Consolas" panose="020B0609020204030204" pitchFamily="49" charset="0"/>
+              </a:rPr>
+              <a:t> 1 byte, the message length is between 0 and 255 bytes.</a:t>
+            </a:r>
+          </a:p>
+          <a:p>
+            <a:r>
+              <a:rPr lang="en-US" sz="1800" dirty="0">
+                <a:solidFill>
+                  <a:srgbClr val="000000"/>
+                </a:solidFill>
+                <a:latin typeface="Consolas" panose="020B0609020204030204" pitchFamily="49" charset="0"/>
+              </a:rPr>
+              <a:t>    - </a:t>
+            </a:r>
+            <a:r>
+              <a:rPr lang="en-US" sz="1800" dirty="0">
+                <a:solidFill>
+                  <a:srgbClr val="0000FF"/>
+                </a:solidFill>
+                <a:latin typeface="Consolas" panose="020B0609020204030204" pitchFamily="49" charset="0"/>
+              </a:rPr>
+              <a:t>`01`</a:t>
+            </a:r>
+            <a:r>
+              <a:rPr lang="en-US" sz="1800" dirty="0">
+                <a:solidFill>
+                  <a:srgbClr val="000000"/>
+                </a:solidFill>
+                <a:latin typeface="Consolas" panose="020B0609020204030204" pitchFamily="49" charset="0"/>
+              </a:rPr>
+              <a:t> 2 bytes, the message length is between 256 and 65535 bytes.</a:t>
+            </a:r>
+          </a:p>
+          <a:p>
+            <a:r>
+              <a:rPr lang="en-US" sz="1800" dirty="0">
+                <a:solidFill>
+                  <a:srgbClr val="000000"/>
+                </a:solidFill>
+                <a:latin typeface="Consolas" panose="020B0609020204030204" pitchFamily="49" charset="0"/>
+              </a:rPr>
+              <a:t>    - </a:t>
+            </a:r>
+            <a:r>
+              <a:rPr lang="en-US" sz="1800" dirty="0">
+                <a:solidFill>
+                  <a:srgbClr val="0000FF"/>
+                </a:solidFill>
+                <a:latin typeface="Consolas" panose="020B0609020204030204" pitchFamily="49" charset="0"/>
+              </a:rPr>
+              <a:t>`10`</a:t>
+            </a:r>
+            <a:r>
+              <a:rPr lang="en-US" sz="1800" dirty="0">
+                <a:solidFill>
+                  <a:srgbClr val="000000"/>
+                </a:solidFill>
+                <a:latin typeface="Consolas" panose="020B0609020204030204" pitchFamily="49" charset="0"/>
+              </a:rPr>
+              <a:t> 3 bytes, the message length is between 65536 and 16 777 215 bytes.</a:t>
+            </a:r>
+          </a:p>
+          <a:p>
+            <a:r>
+              <a:rPr lang="en-US" sz="1800" dirty="0">
+                <a:solidFill>
+                  <a:srgbClr val="000000"/>
+                </a:solidFill>
+                <a:latin typeface="Consolas" panose="020B0609020204030204" pitchFamily="49" charset="0"/>
+              </a:rPr>
+              <a:t>    - </a:t>
+            </a:r>
+            <a:r>
+              <a:rPr lang="en-US" sz="1800" dirty="0">
+                <a:solidFill>
+                  <a:srgbClr val="0000FF"/>
+                </a:solidFill>
+                <a:latin typeface="Consolas" panose="020B0609020204030204" pitchFamily="49" charset="0"/>
+              </a:rPr>
+              <a:t>`11`</a:t>
+            </a:r>
+            <a:r>
+              <a:rPr lang="en-US" sz="1800" dirty="0">
+                <a:solidFill>
+                  <a:srgbClr val="000000"/>
+                </a:solidFill>
+                <a:latin typeface="Consolas" panose="020B0609020204030204" pitchFamily="49" charset="0"/>
+              </a:rPr>
+              <a:t> 4 bytes, the message length is between 16 777 216 and 2 147 483 648 bytes (2 Gib).</a:t>
+            </a:r>
+          </a:p>
+          <a:p>
+            <a:r>
+              <a:rPr lang="en-US" sz="1800" dirty="0">
+                <a:solidFill>
+                  <a:srgbClr val="000000"/>
+                </a:solidFill>
+                <a:latin typeface="Consolas" panose="020B0609020204030204" pitchFamily="49" charset="0"/>
+              </a:rPr>
+              <a:t>  - The </a:t>
+            </a:r>
+            <a:r>
+              <a:rPr lang="en-US" sz="1800" dirty="0">
+                <a:solidFill>
+                  <a:srgbClr val="0000FF"/>
+                </a:solidFill>
+                <a:latin typeface="Consolas" panose="020B0609020204030204" pitchFamily="49" charset="0"/>
+              </a:rPr>
+              <a:t>`CD`</a:t>
+            </a:r>
+            <a:r>
+              <a:rPr lang="en-US" sz="1800" dirty="0">
+                <a:solidFill>
+                  <a:srgbClr val="000000"/>
+                </a:solidFill>
+                <a:latin typeface="Consolas" panose="020B0609020204030204" pitchFamily="49" charset="0"/>
+              </a:rPr>
+              <a:t> bit is the "Control vs. Data" bit. This is a convenient bit that can be used by protocols</a:t>
+            </a:r>
+          </a:p>
+          <a:p>
+            <a:r>
+              <a:rPr lang="en-US" sz="1800" dirty="0">
+                <a:solidFill>
+                  <a:srgbClr val="000000"/>
+                </a:solidFill>
+                <a:latin typeface="Consolas" panose="020B0609020204030204" pitchFamily="49" charset="0"/>
+              </a:rPr>
+              <a:t>    as a one-bit discriminator, typically between a regular data message and one (or more) control message.</a:t>
+            </a:r>
+          </a:p>
+          <a:p>
+            <a:r>
+              <a:rPr lang="en-US" sz="1800" dirty="0">
+                <a:solidFill>
+                  <a:srgbClr val="000000"/>
+                </a:solidFill>
+                <a:latin typeface="Consolas" panose="020B0609020204030204" pitchFamily="49" charset="0"/>
+              </a:rPr>
+              <a:t>  - </a:t>
+            </a:r>
+            <a:r>
+              <a:rPr lang="en-US" sz="1800" dirty="0">
+                <a:solidFill>
+                  <a:srgbClr val="0000FF"/>
+                </a:solidFill>
+                <a:latin typeface="Consolas" panose="020B0609020204030204" pitchFamily="49" charset="0"/>
+              </a:rPr>
+              <a:t>`R0`</a:t>
+            </a:r>
+            <a:r>
+              <a:rPr lang="en-US" sz="1800" dirty="0">
+                <a:solidFill>
+                  <a:srgbClr val="000000"/>
+                </a:solidFill>
+                <a:latin typeface="Consolas" panose="020B0609020204030204" pitchFamily="49" charset="0"/>
+              </a:rPr>
+              <a:t> and </a:t>
+            </a:r>
+            <a:r>
+              <a:rPr lang="en-US" sz="1800" dirty="0">
+                <a:solidFill>
+                  <a:srgbClr val="0000FF"/>
+                </a:solidFill>
+                <a:latin typeface="Consolas" panose="020B0609020204030204" pitchFamily="49" charset="0"/>
+              </a:rPr>
+              <a:t>`R1`</a:t>
+            </a:r>
+            <a:r>
+              <a:rPr lang="en-US" sz="1800" dirty="0">
+                <a:solidFill>
+                  <a:srgbClr val="000000"/>
+                </a:solidFill>
+                <a:latin typeface="Consolas" panose="020B0609020204030204" pitchFamily="49" charset="0"/>
+              </a:rPr>
+              <a:t> bit are reserved for future use.</a:t>
+            </a:r>
+          </a:p>
+          <a:p>
+            <a:r>
+              <a:rPr lang="en-US" sz="1800" dirty="0">
+                <a:solidFill>
+                  <a:srgbClr val="000000"/>
+                </a:solidFill>
+                <a:latin typeface="Consolas" panose="020B0609020204030204" pitchFamily="49" charset="0"/>
+              </a:rPr>
+              <a:t>  - P0-P2 bits is the Protocol, a number between 0 and 7. This number defines the "type" of the</a:t>
+            </a:r>
+          </a:p>
+          <a:p>
+            <a:r>
+              <a:rPr lang="en-US" sz="1800" dirty="0">
+                <a:solidFill>
+                  <a:srgbClr val="000000"/>
+                </a:solidFill>
+                <a:latin typeface="Consolas" panose="020B0609020204030204" pitchFamily="49" charset="0"/>
+              </a:rPr>
+              <a:t>  message: the writer or serializer that has been used to write the payload and the reader or "</a:t>
             </a:r>
             <a:r>
               <a:rPr lang="en-US" sz="1800" dirty="0" err="1">
@@ -1784,7 +1734,7 @@
                 </a:solidFill>
                 <a:latin typeface="Consolas" panose="020B0609020204030204" pitchFamily="49" charset="0"/>
               </a:rPr>
-              <a:t>CK.AppIdentity.TransportLayer</a:t>
+              <a:t>deserializer</a:t>
             </a:r>
             <a:r>
               <a:rPr lang="en-US" sz="1800" dirty="0">
@@ -1793,7 +1743,7 @@
                 </a:solidFill>
                 <a:latin typeface="Consolas" panose="020B0609020204030204" pitchFamily="49" charset="0"/>
               </a:rPr>
-              <a:t> itself that handles</a:t>
+              <a:t>"</a:t>
             </a:r>
           </a:p>
           <a:p>
@@ -1804,7 +1754,7 @@
                 </a:solidFill>
                 <a:latin typeface="Consolas" panose="020B0609020204030204" pitchFamily="49" charset="0"/>
               </a:rPr>
-              <a:t>special messages used to negotiate, accept, reject incoming parties and outgoing connections.</a:t>
+              <a:t>  that must be used to read it back.</a:t>
             </a:r>
           </a:p>
           <a:p>
@@ -1815,7 +1765,7 @@
                 </a:solidFill>
                 <a:latin typeface="Consolas" panose="020B0609020204030204" pitchFamily="49" charset="0"/>
               </a:rPr>
-              <a:t>This lets 7 possible protocols. This may seem a limitation however this limit applies to a Remote party pair: there</a:t>
+              <a:t>- Then comes the message length itself (1 to 4 bytes)</a:t>
             </a:r>
           </a:p>
           <a:p>
@@ -1826,18 +1776,7 @@
                 </a:solidFill>
                 <a:latin typeface="Consolas" panose="020B0609020204030204" pitchFamily="49" charset="0"/>
               </a:rPr>
-              <a:t>can be any number of possible protocols in an application, among them 2 parties that start to interact initially</a:t>
-            </a:r>
-          </a:p>
-          <a:p>
-            <a:r>
-              <a:rPr lang="en-US" sz="1800" dirty="0">
-                <a:solidFill>
-                  <a:srgbClr val="000000"/>
-                </a:solidFill>
-                <a:latin typeface="Consolas" panose="020B0609020204030204" pitchFamily="49" charset="0"/>
-              </a:rPr>
-              <a:t>negotiate the ones they can and want to use. Any Transport between 2 parties can support up to 7 different protocols.</a:t>
+              <a:t>- Then the message payload itself.</a:t>
             </a:r>
           </a:p>
           <a:p>
@@ -1856,22 +1795,46 @@
                 </a:solidFill>
                 <a:latin typeface="Consolas" panose="020B0609020204030204" pitchFamily="49" charset="0"/>
               </a:rPr>
-              <a:t>The final length of a message on the wire is between 2 bytes (the special Empty message, see below) and 2 Gib.</a:t>
-            </a:r>
-          </a:p>
-          <a:p>
+              <a:t>At a higher level </a:t>
+            </a:r>
             <a:r>
               <a:rPr lang="en-US" sz="1800" dirty="0">
                 <a:solidFill>
+                  <a:srgbClr val="A31515"/>
+                </a:solidFill>
+                <a:latin typeface="Consolas" panose="020B0609020204030204" pitchFamily="49" charset="0"/>
+              </a:rPr>
+              <a:t>"</a:t>
+            </a:r>
+            <a:r>
+              <a:rPr lang="en-US" sz="1800" dirty="0" err="1">
+                <a:solidFill>
                   <a:srgbClr val="000000"/>
                 </a:solidFill>
                 <a:latin typeface="Consolas" panose="020B0609020204030204" pitchFamily="49" charset="0"/>
               </a:rPr>
-              <a:t>A minimal 1 byte message requires 3 bytes (in any of the 7 available protocols). </a:t>
-            </a:r>
-          </a:p>
-          <a:p>
-            <a:endParaRPr lang="en-US" dirty="0"/>
+              <a:t>MessageProtocol</a:t>
+            </a:r>
+            <a:r>
+              <a:rPr lang="en-US" sz="1800" dirty="0">
+                <a:solidFill>
+                  <a:srgbClr val="000000"/>
+                </a:solidFill>
+                <a:latin typeface="Consolas" panose="020B0609020204030204" pitchFamily="49" charset="0"/>
+              </a:rPr>
+              <a:t>” are identified by a string (its unique name).</a:t>
+            </a:r>
+          </a:p>
+          <a:p>
+            <a:r>
+              <a:rPr lang="en-US" sz="1800" dirty="0">
+                <a:solidFill>
+                  <a:srgbClr val="000000"/>
+                </a:solidFill>
+                <a:latin typeface="Consolas" panose="020B0609020204030204" pitchFamily="49" charset="0"/>
+              </a:rPr>
+              <a:t>A protocol defines how the message is encoded and how they are exchanged: by merging these 2 concepts here, we greatly simplify the implementation and the understandability of the Transport layer. The protocol simply defines the encoding it uses.</a:t>
+            </a:r>
           </a:p>
         </p:txBody>
       </p:sp>
@@ -1892,7 +1855,7 @@
           <a:p>
             <a:fld id="{E05EDB92-2FE2-4164-AA27-D03258A20DF4}" type="slidenum">
               <a:rPr lang="en-US" smtClean="0"/>
-              <a:t>31</a:t>
+              <a:t>30</a:t>
             </a:fld>
             <a:endParaRPr lang="en-US"/>
           </a:p>
@@ -1901,7 +1864,7 @@
     </p:spTree>
     <p:extLst>
       <p:ext uri="{BB962C8B-B14F-4D97-AF65-F5344CB8AC3E}">
-        <p14:creationId xmlns:p14="http://schemas.microsoft.com/office/powerpoint/2010/main" val="1132549190"/>
+        <p14:creationId xmlns:p14="http://schemas.microsoft.com/office/powerpoint/2010/main" val="4115452317"/>
       </p:ext>
     </p:extLst>
   </p:cSld>
@@ -1955,6 +1918,127 @@
           <a:bodyPr/>
           <a:lstStyle/>
           <a:p>
+            <a:r>
+              <a:rPr lang="en-US" sz="1800" dirty="0">
+                <a:solidFill>
+                  <a:srgbClr val="000000"/>
+                </a:solidFill>
+                <a:latin typeface="Consolas" panose="020B0609020204030204" pitchFamily="49" charset="0"/>
+              </a:rPr>
+              <a:t>The </a:t>
+            </a:r>
+            <a:r>
+              <a:rPr lang="en-US" sz="1800" dirty="0">
+                <a:solidFill>
+                  <a:srgbClr val="0000FF"/>
+                </a:solidFill>
+                <a:latin typeface="Consolas" panose="020B0609020204030204" pitchFamily="49" charset="0"/>
+              </a:rPr>
+              <a:t>`"0 Protocol"`</a:t>
+            </a:r>
+            <a:r>
+              <a:rPr lang="en-US" sz="1800" dirty="0">
+                <a:solidFill>
+                  <a:srgbClr val="000000"/>
+                </a:solidFill>
+                <a:latin typeface="Consolas" panose="020B0609020204030204" pitchFamily="49" charset="0"/>
+              </a:rPr>
+              <a:t> protocol name is reserved: this is the protocol of </a:t>
+            </a:r>
+            <a:r>
+              <a:rPr lang="en-US" sz="1800" dirty="0" err="1">
+                <a:solidFill>
+                  <a:srgbClr val="000000"/>
+                </a:solidFill>
+                <a:latin typeface="Consolas" panose="020B0609020204030204" pitchFamily="49" charset="0"/>
+              </a:rPr>
+              <a:t>CK.AppIdentity.TransportLayer</a:t>
+            </a:r>
+            <a:r>
+              <a:rPr lang="en-US" sz="1800" dirty="0">
+                <a:solidFill>
+                  <a:srgbClr val="000000"/>
+                </a:solidFill>
+                <a:latin typeface="Consolas" panose="020B0609020204030204" pitchFamily="49" charset="0"/>
+              </a:rPr>
+              <a:t> itself that handles</a:t>
+            </a:r>
+          </a:p>
+          <a:p>
+            <a:r>
+              <a:rPr lang="en-US" sz="1800" dirty="0">
+                <a:solidFill>
+                  <a:srgbClr val="000000"/>
+                </a:solidFill>
+                <a:latin typeface="Consolas" panose="020B0609020204030204" pitchFamily="49" charset="0"/>
+              </a:rPr>
+              <a:t>special messages used to negotiate, accept, reject incoming parties and outgoing connections.</a:t>
+            </a:r>
+          </a:p>
+          <a:p>
+            <a:r>
+              <a:rPr lang="en-US" sz="1800" dirty="0">
+                <a:solidFill>
+                  <a:srgbClr val="000000"/>
+                </a:solidFill>
+                <a:latin typeface="Consolas" panose="020B0609020204030204" pitchFamily="49" charset="0"/>
+              </a:rPr>
+              <a:t>This lets 7 possible protocols. This may seem a limitation however this limit applies to a Remote party pair: there</a:t>
+            </a:r>
+          </a:p>
+          <a:p>
+            <a:r>
+              <a:rPr lang="en-US" sz="1800" dirty="0">
+                <a:solidFill>
+                  <a:srgbClr val="000000"/>
+                </a:solidFill>
+                <a:latin typeface="Consolas" panose="020B0609020204030204" pitchFamily="49" charset="0"/>
+              </a:rPr>
+              <a:t>can be any number of possible protocols in an application, among them 2 parties that start to interact initially</a:t>
+            </a:r>
+          </a:p>
+          <a:p>
+            <a:r>
+              <a:rPr lang="en-US" sz="1800" dirty="0">
+                <a:solidFill>
+                  <a:srgbClr val="000000"/>
+                </a:solidFill>
+                <a:latin typeface="Consolas" panose="020B0609020204030204" pitchFamily="49" charset="0"/>
+              </a:rPr>
+              <a:t>negotiate the ones they can and want to use. Any Transport between 2 parties can support up to 7 different protocols.</a:t>
+            </a:r>
+          </a:p>
+          <a:p>
+            <a:endParaRPr lang="en-US" sz="1800" dirty="0">
+              <a:solidFill>
+                <a:srgbClr val="000000"/>
+              </a:solidFill>
+              <a:latin typeface="Consolas" panose="020B0609020204030204" pitchFamily="49" charset="0"/>
+            </a:endParaRPr>
+          </a:p>
+          <a:p>
+            <a:r>
+              <a:rPr lang="en-US" sz="1800" dirty="0">
+                <a:solidFill>
+                  <a:srgbClr val="000000"/>
+                </a:solidFill>
+                <a:latin typeface="Consolas" panose="020B0609020204030204" pitchFamily="49" charset="0"/>
+              </a:rPr>
+              <a:t>The final length of a message on the wire is between 2 bytes (the special Empty message, see below) and 2 Gib.</a:t>
+            </a:r>
+          </a:p>
+          <a:p>
+            <a:r>
+              <a:rPr lang="en-US" sz="1800" dirty="0">
+                <a:solidFill>
+                  <a:srgbClr val="000000"/>
+                </a:solidFill>
+                <a:latin typeface="Consolas" panose="020B0609020204030204" pitchFamily="49" charset="0"/>
+              </a:rPr>
+              <a:t>A minimal 1 byte message requires 3 bytes (in any of the 7 available protocols). </a:t>
+            </a:r>
+          </a:p>
+          <a:p>
             <a:endParaRPr lang="en-US" dirty="0"/>
           </a:p>
         </p:txBody>
@@ -1976,7 +2060,7 @@
           <a:p>
             <a:fld id="{E05EDB92-2FE2-4164-AA27-D03258A20DF4}" type="slidenum">
               <a:rPr lang="en-US" smtClean="0"/>
-              <a:t>33</a:t>
+              <a:t>31</a:t>
             </a:fld>
             <a:endParaRPr lang="en-US"/>
           </a:p>
@@ -1985,7 +2069,7 @@
     </p:spTree>
     <p:extLst>
       <p:ext uri="{BB962C8B-B14F-4D97-AF65-F5344CB8AC3E}">
-        <p14:creationId xmlns:p14="http://schemas.microsoft.com/office/powerpoint/2010/main" val="213048778"/>
+        <p14:creationId xmlns:p14="http://schemas.microsoft.com/office/powerpoint/2010/main" val="1132549190"/>
       </p:ext>
     </p:extLst>
   </p:cSld>
@@ -2142,7 +2226,7 @@
           <a:p>
             <a:fld id="{7D1F2140-8D48-49AC-AD8D-683E6FF4DC34}" type="datetimeFigureOut">
               <a:rPr lang="en-US" smtClean="0"/>
-              <a:t>12/5/2023</a:t>
+              <a:t>12/9/2023</a:t>
             </a:fld>
             <a:endParaRPr lang="en-US"/>
           </a:p>
@@ -2340,7 +2424,7 @@
           <a:p>
             <a:fld id="{7D1F2140-8D48-49AC-AD8D-683E6FF4DC34}" type="datetimeFigureOut">
               <a:rPr lang="en-US" smtClean="0"/>
-              <a:t>12/5/2023</a:t>
+              <a:t>12/9/2023</a:t>
             </a:fld>
             <a:endParaRPr lang="en-US"/>
           </a:p>
@@ -2548,7 +2632,7 @@
           <a:p>
             <a:fld id="{7D1F2140-8D48-49AC-AD8D-683E6FF4DC34}" type="datetimeFigureOut">
               <a:rPr lang="en-US" smtClean="0"/>
-              <a:t>12/5/2023</a:t>
+              <a:t>12/9/2023</a:t>
             </a:fld>
             <a:endParaRPr lang="en-US"/>
           </a:p>
@@ -2746,7 +2830,7 @@
           <a:p>
             <a:fld id="{7D1F2140-8D48-49AC-AD8D-683E6FF4DC34}" type="datetimeFigureOut">
               <a:rPr lang="en-US" smtClean="0"/>
-              <a:t>12/5/2023</a:t>
+              <a:t>12/9/2023</a:t>
             </a:fld>
             <a:endParaRPr lang="en-US"/>
           </a:p>
@@ -3021,7 +3105,7 @@
           <a:p>
             <a:fld id="{7D1F2140-8D48-49AC-AD8D-683E6FF4DC34}" type="datetimeFigureOut">
               <a:rPr lang="en-US" smtClean="0"/>
-              <a:t>12/5/2023</a:t>
+              <a:t>12/9/2023</a:t>
             </a:fld>
             <a:endParaRPr lang="en-US"/>
           </a:p>
@@ -3286,7 +3370,7 @@
           <a:p>
             <a:fld id="{7D1F2140-8D48-49AC-AD8D-683E6FF4DC34}" type="datetimeFigureOut">
               <a:rPr lang="en-US" smtClean="0"/>
-              <a:t>12/5/2023</a:t>
+              <a:t>12/9/2023</a:t>
             </a:fld>
             <a:endParaRPr lang="en-US"/>
           </a:p>
@@ -3698,7 +3782,7 @@
           <a:p>
             <a:fld id="{7D1F2140-8D48-49AC-AD8D-683E6FF4DC34}" type="datetimeFigureOut">
               <a:rPr lang="en-US" smtClean="0"/>
-              <a:t>12/5/2023</a:t>
+              <a:t>12/9/2023</a:t>
             </a:fld>
             <a:endParaRPr lang="en-US"/>
           </a:p>
@@ -3839,7 +3923,7 @@
           <a:p>
             <a:fld id="{7D1F2140-8D48-49AC-AD8D-683E6FF4DC34}" type="datetimeFigureOut">
               <a:rPr lang="en-US" smtClean="0"/>
-              <a:t>12/5/2023</a:t>
+              <a:t>12/9/2023</a:t>
             </a:fld>
             <a:endParaRPr lang="en-US"/>
           </a:p>
@@ -3952,7 +4036,7 @@
           <a:p>
             <a:fld id="{7D1F2140-8D48-49AC-AD8D-683E6FF4DC34}" type="datetimeFigureOut">
               <a:rPr lang="en-US" smtClean="0"/>
-              <a:t>12/5/2023</a:t>
+              <a:t>12/9/2023</a:t>
             </a:fld>
             <a:endParaRPr lang="en-US"/>
           </a:p>
@@ -4263,7 +4347,7 @@
           <a:p>
             <a:fld id="{7D1F2140-8D48-49AC-AD8D-683E6FF4DC34}" type="datetimeFigureOut">
               <a:rPr lang="en-US" smtClean="0"/>
-              <a:t>12/5/2023</a:t>
+              <a:t>12/9/2023</a:t>
             </a:fld>
             <a:endParaRPr lang="en-US"/>
           </a:p>
@@ -4551,7 +4635,7 @@
           <a:p>
             <a:fld id="{7D1F2140-8D48-49AC-AD8D-683E6FF4DC34}" type="datetimeFigureOut">
               <a:rPr lang="en-US" smtClean="0"/>
-              <a:t>12/5/2023</a:t>
+              <a:t>12/9/2023</a:t>
             </a:fld>
             <a:endParaRPr lang="en-US"/>
           </a:p>
@@ -4792,7 +4876,7 @@
           <a:p>
             <a:fld id="{7D1F2140-8D48-49AC-AD8D-683E6FF4DC34}" type="datetimeFigureOut">
               <a:rPr lang="en-US" smtClean="0"/>
-              <a:t>12/5/2023</a:t>
+              <a:t>12/9/2023</a:t>
             </a:fld>
             <a:endParaRPr lang="en-US"/>
           </a:p>
@@ -12017,10 +12101,10 @@
       </p:sp>
       <p:pic>
         <p:nvPicPr>
-          <p:cNvPr id="5" name="Picture 4" descr="A screenshot of a computer&#10;&#10;Description automatically generated">
+          <p:cNvPr id="7" name="Picture 6" descr="A screenshot of a computer&#10;&#10;Description automatically generated">
             <a:extLst>
               <a:ext uri="{FF2B5EF4-FFF2-40B4-BE49-F238E27FC236}">
-                <a16:creationId xmlns:a16="http://schemas.microsoft.com/office/drawing/2014/main" id="{C877AF6B-7CB2-7C72-78B8-A3149BA3EE51}"/>
+                <a16:creationId xmlns:a16="http://schemas.microsoft.com/office/drawing/2014/main" id="{D81EF2D8-889E-977F-CD52-2FA4E99F5FD6}"/>
               </a:ext>
             </a:extLst>
           </p:cNvPr>
@@ -12030,7 +12114,7 @@
           <p:nvPr/>
         </p:nvPicPr>
         <p:blipFill>
-          <a:blip r:embed="rId2">
+          <a:blip r:embed="rId3">
             <a:extLst>
               <a:ext uri="{28A0092B-C50C-407E-A947-70E740481C1C}">
                 <a14:useLocalDpi xmlns:a14="http://schemas.microsoft.com/office/drawing/2010/main" val="0"/>
@@ -12043,8 +12127,8 @@
         </p:blipFill>
         <p:spPr>
           <a:xfrm>
-            <a:off x="3728273" y="117700"/>
-            <a:ext cx="8014681" cy="6858000"/>
+            <a:off x="4162448" y="0"/>
+            <a:ext cx="7818993" cy="6858000"/>
           </a:xfrm>
           <a:prstGeom prst="rect">
             <a:avLst/>
@@ -13030,10 +13114,10 @@
       </p:sp>
       <p:pic>
         <p:nvPicPr>
-          <p:cNvPr id="4" name="Picture 3" descr="A screenshot of a computer&#10;&#10;Description automatically generated">
+          <p:cNvPr id="5" name="Picture 4" descr="A screenshot of a computer&#10;&#10;Description automatically generated">
             <a:extLst>
               <a:ext uri="{FF2B5EF4-FFF2-40B4-BE49-F238E27FC236}">
-                <a16:creationId xmlns:a16="http://schemas.microsoft.com/office/drawing/2014/main" id="{3AD36ADA-EB10-96CB-DB0B-136F15875DE1}"/>
+                <a16:creationId xmlns:a16="http://schemas.microsoft.com/office/drawing/2014/main" id="{00BBBD6C-B19D-3418-AEA0-2B18219F2EE9}"/>
               </a:ext>
             </a:extLst>
           </p:cNvPr>
@@ -13056,7 +13140,7 @@
         </p:blipFill>
         <p:spPr>
           <a:xfrm>
-            <a:off x="7467905" y="0"/>
+            <a:off x="7488926" y="0"/>
             <a:ext cx="4171996" cy="6858000"/>
           </a:xfrm>
           <a:prstGeom prst="rect">

</xml_diff>